<commit_message>
Minor chnages from week 3
</commit_message>
<xml_diff>
--- a/Week1/BESD Week 1.pptx
+++ b/Week1/BESD Week 1.pptx
@@ -131,14 +131,6 @@
     </p:ext>
   </p:extLst>
 </p:presentation>
-</file>
-
-<file path=ppt/revisionInfo.xml><?xml version="1.0" encoding="utf-8"?>
-<p1510:revInfo xmlns:a="http://schemas.openxmlformats.org/drawingml/2006/main" xmlns:r="http://schemas.openxmlformats.org/officeDocument/2006/relationships" xmlns:p1510="http://schemas.microsoft.com/office/powerpoint/2015/10/main">
-  <p1510:revLst>
-    <p1510:client id="{D941CC75-1891-403D-82AF-B9A758403F85}" v="163" dt="2023-03-15T00:57:20.626"/>
-  </p1510:revLst>
-</p1510:revInfo>
 </file>
 
 <file path=ppt/changesInfos/changesInfo1.xml><?xml version="1.0" encoding="utf-8"?>
@@ -1092,6 +1084,30 @@
       </pc:sldMasterChg>
     </pc:docChg>
   </pc:docChgLst>
+  <pc:docChgLst>
+    <pc:chgData name="Charles Kiefriter" userId="a996b49251c4dfd2" providerId="LiveId" clId="{468772DE-8935-4E86-89CF-99D07AEAB8F3}"/>
+    <pc:docChg chg="modSld">
+      <pc:chgData name="Charles Kiefriter" userId="a996b49251c4dfd2" providerId="LiveId" clId="{468772DE-8935-4E86-89CF-99D07AEAB8F3}" dt="2023-11-28T03:17:34.897" v="0" actId="1036"/>
+      <pc:docMkLst>
+        <pc:docMk/>
+      </pc:docMkLst>
+      <pc:sldChg chg="modSp mod">
+        <pc:chgData name="Charles Kiefriter" userId="a996b49251c4dfd2" providerId="LiveId" clId="{468772DE-8935-4E86-89CF-99D07AEAB8F3}" dt="2023-11-28T03:17:34.897" v="0" actId="1036"/>
+        <pc:sldMkLst>
+          <pc:docMk/>
+          <pc:sldMk cId="3194223319" sldId="263"/>
+        </pc:sldMkLst>
+        <pc:spChg chg="mod">
+          <ac:chgData name="Charles Kiefriter" userId="a996b49251c4dfd2" providerId="LiveId" clId="{468772DE-8935-4E86-89CF-99D07AEAB8F3}" dt="2023-11-28T03:17:34.897" v="0" actId="1036"/>
+          <ac:spMkLst>
+            <pc:docMk/>
+            <pc:sldMk cId="3194223319" sldId="263"/>
+            <ac:spMk id="3" creationId="{23DFC7E9-54DD-38D7-0B9B-D34948D68CF9}"/>
+          </ac:spMkLst>
+        </pc:spChg>
+      </pc:sldChg>
+    </pc:docChg>
+  </pc:docChgLst>
 </pc:chgInfo>
 </file>
 
@@ -1242,7 +1258,7 @@
           <a:p>
             <a:fld id="{33D569A9-A222-4DCC-AF28-BB813B4F2ABB}" type="datetimeFigureOut">
               <a:rPr lang="en-US" smtClean="0"/>
-              <a:t>3/14/2023</a:t>
+              <a:t>11/27/2023</a:t>
             </a:fld>
             <a:endParaRPr lang="en-US"/>
           </a:p>
@@ -1530,7 +1546,7 @@
           <a:p>
             <a:fld id="{33D569A9-A222-4DCC-AF28-BB813B4F2ABB}" type="datetimeFigureOut">
               <a:rPr lang="en-US" smtClean="0"/>
-              <a:t>3/14/2023</a:t>
+              <a:t>11/27/2023</a:t>
             </a:fld>
             <a:endParaRPr lang="en-US"/>
           </a:p>
@@ -1728,7 +1744,7 @@
           <a:p>
             <a:fld id="{33D569A9-A222-4DCC-AF28-BB813B4F2ABB}" type="datetimeFigureOut">
               <a:rPr lang="en-US" smtClean="0"/>
-              <a:t>3/14/2023</a:t>
+              <a:t>11/27/2023</a:t>
             </a:fld>
             <a:endParaRPr lang="en-US"/>
           </a:p>
@@ -1936,7 +1952,7 @@
           <a:p>
             <a:fld id="{33D569A9-A222-4DCC-AF28-BB813B4F2ABB}" type="datetimeFigureOut">
               <a:rPr lang="en-US" smtClean="0"/>
-              <a:t>3/14/2023</a:t>
+              <a:t>11/27/2023</a:t>
             </a:fld>
             <a:endParaRPr lang="en-US"/>
           </a:p>
@@ -2134,7 +2150,7 @@
           <a:p>
             <a:fld id="{33D569A9-A222-4DCC-AF28-BB813B4F2ABB}" type="datetimeFigureOut">
               <a:rPr lang="en-US" smtClean="0"/>
-              <a:t>3/14/2023</a:t>
+              <a:t>11/27/2023</a:t>
             </a:fld>
             <a:endParaRPr lang="en-US"/>
           </a:p>
@@ -2409,7 +2425,7 @@
           <a:p>
             <a:fld id="{33D569A9-A222-4DCC-AF28-BB813B4F2ABB}" type="datetimeFigureOut">
               <a:rPr lang="en-US" smtClean="0"/>
-              <a:t>3/14/2023</a:t>
+              <a:t>11/27/2023</a:t>
             </a:fld>
             <a:endParaRPr lang="en-US"/>
           </a:p>
@@ -2674,7 +2690,7 @@
           <a:p>
             <a:fld id="{33D569A9-A222-4DCC-AF28-BB813B4F2ABB}" type="datetimeFigureOut">
               <a:rPr lang="en-US" smtClean="0"/>
-              <a:t>3/14/2023</a:t>
+              <a:t>11/27/2023</a:t>
             </a:fld>
             <a:endParaRPr lang="en-US"/>
           </a:p>
@@ -3086,7 +3102,7 @@
           <a:p>
             <a:fld id="{33D569A9-A222-4DCC-AF28-BB813B4F2ABB}" type="datetimeFigureOut">
               <a:rPr lang="en-US" smtClean="0"/>
-              <a:t>3/14/2023</a:t>
+              <a:t>11/27/2023</a:t>
             </a:fld>
             <a:endParaRPr lang="en-US"/>
           </a:p>
@@ -3227,7 +3243,7 @@
           <a:p>
             <a:fld id="{33D569A9-A222-4DCC-AF28-BB813B4F2ABB}" type="datetimeFigureOut">
               <a:rPr lang="en-US" smtClean="0"/>
-              <a:t>3/14/2023</a:t>
+              <a:t>11/27/2023</a:t>
             </a:fld>
             <a:endParaRPr lang="en-US"/>
           </a:p>
@@ -3340,7 +3356,7 @@
           <a:p>
             <a:fld id="{33D569A9-A222-4DCC-AF28-BB813B4F2ABB}" type="datetimeFigureOut">
               <a:rPr lang="en-US" smtClean="0"/>
-              <a:t>3/14/2023</a:t>
+              <a:t>11/27/2023</a:t>
             </a:fld>
             <a:endParaRPr lang="en-US"/>
           </a:p>
@@ -3686,7 +3702,7 @@
           <a:p>
             <a:fld id="{33D569A9-A222-4DCC-AF28-BB813B4F2ABB}" type="datetimeFigureOut">
               <a:rPr lang="en-US" smtClean="0"/>
-              <a:t>3/14/2023</a:t>
+              <a:t>11/27/2023</a:t>
             </a:fld>
             <a:endParaRPr lang="en-US"/>
           </a:p>
@@ -3927,7 +3943,7 @@
           <a:p>
             <a:fld id="{33D569A9-A222-4DCC-AF28-BB813B4F2ABB}" type="datetimeFigureOut">
               <a:rPr lang="en-US" smtClean="0"/>
-              <a:t>3/14/2023</a:t>
+              <a:t>11/27/2023</a:t>
             </a:fld>
             <a:endParaRPr lang="en-US"/>
           </a:p>
@@ -4359,7 +4375,7 @@
         </p:nvSpPr>
         <p:spPr>
           <a:xfrm>
-            <a:off x="696537" y="87952"/>
+            <a:off x="696537" y="97005"/>
             <a:ext cx="9326104" cy="6724918"/>
           </a:xfrm>
           <a:prstGeom prst="rect">

</xml_diff>